<commit_message>
Update 297 Project Presentation.pptx
</commit_message>
<xml_diff>
--- a/297 Project Presentation.pptx
+++ b/297 Project Presentation.pptx
@@ -271,7 +271,7 @@
   </p:defaultTextStyle>
   <p:extLst>
     <p:ext uri="{EFAFB233-063F-42B5-8137-9DF3F51BA10A}">
-      <p15:sldGuideLst xmlns:p15="http://schemas.microsoft.com/office/powerpoint/2012/main" xmlns:p14="http://schemas.microsoft.com/office/powerpoint/2010/main" xmlns:com="http://schemas.openxmlformats.org/drawingml/2006/compatibility" xmlns:pvml="urn:schemas-microsoft-com:office:powerpoint" xmlns:v="urn:schemas-microsoft-com:vml" xmlns:o="urn:schemas-microsoft-com:office:office" xmlns:dgm="http://schemas.openxmlformats.org/drawingml/2006/diagram" xmlns:c="http://schemas.openxmlformats.org/drawingml/2006/chart" xmlns:mv="urn:schemas-microsoft-com:mac:vml" xmlns:mc="http://schemas.openxmlformats.org/markup-compatibility/2006" xmlns="">
+      <p15:sldGuideLst xmlns="" xmlns:mc="http://schemas.openxmlformats.org/markup-compatibility/2006" xmlns:mv="urn:schemas-microsoft-com:mac:vml" xmlns:c="http://schemas.openxmlformats.org/drawingml/2006/chart" xmlns:dgm="http://schemas.openxmlformats.org/drawingml/2006/diagram" xmlns:o="urn:schemas-microsoft-com:office:office" xmlns:v="urn:schemas-microsoft-com:vml" xmlns:pvml="urn:schemas-microsoft-com:office:powerpoint" xmlns:com="http://schemas.openxmlformats.org/drawingml/2006/compatibility" xmlns:p14="http://schemas.microsoft.com/office/powerpoint/2010/main" xmlns:p15="http://schemas.microsoft.com/office/powerpoint/2012/main">
         <p15:guide id="1" orient="horz" pos="1620">
           <p15:clr>
             <a:srgbClr val="A4A3A4"/>
@@ -5805,14 +5805,14 @@
               <a:buNone/>
             </a:pPr>
             <a:r>
-              <a:rPr lang="zh-CN" sz="1400" dirty="0" smtClean="0">
+              <a:rPr lang="zh-CN" sz="1600" dirty="0" smtClean="0">
                 <a:solidFill>
                   <a:schemeClr val="tx1"/>
                 </a:solidFill>
               </a:rPr>
               <a:t>Gaochao Wang</a:t>
             </a:r>
-            <a:endParaRPr lang="en-US" altLang="zh-CN" sz="1400" dirty="0" smtClean="0">
+            <a:endParaRPr lang="en-US" altLang="zh-CN" sz="1600" dirty="0" smtClean="0">
               <a:solidFill>
                 <a:schemeClr val="tx1"/>
               </a:solidFill>
@@ -5837,7 +5837,7 @@
               <a:buNone/>
             </a:pPr>
             <a:r>
-              <a:rPr lang="en-US" altLang="zh-CN" sz="1400" dirty="0" err="1" smtClean="0">
+              <a:rPr lang="en-US" altLang="zh-CN" sz="1600" dirty="0" err="1" smtClean="0">
                 <a:solidFill>
                   <a:schemeClr val="tx1"/>
                 </a:solidFill>
@@ -5845,7 +5845,7 @@
               <a:t>Ruizhe</a:t>
             </a:r>
             <a:r>
-              <a:rPr lang="en-US" altLang="zh-CN" sz="1400" dirty="0" smtClean="0">
+              <a:rPr lang="en-US" altLang="zh-CN" sz="1600" dirty="0" smtClean="0">
                 <a:solidFill>
                   <a:schemeClr val="tx1"/>
                 </a:solidFill>
@@ -5872,7 +5872,7 @@
               <a:buNone/>
             </a:pPr>
             <a:r>
-              <a:rPr lang="en-US" altLang="zh-CN" sz="1400" dirty="0" err="1" smtClean="0">
+              <a:rPr lang="en-US" altLang="zh-CN" sz="1600" dirty="0" err="1" smtClean="0">
                 <a:solidFill>
                   <a:schemeClr val="tx1"/>
                 </a:solidFill>
@@ -5880,14 +5880,14 @@
               <a:t>Zixin</a:t>
             </a:r>
             <a:r>
-              <a:rPr lang="en-US" altLang="zh-CN" sz="1400" dirty="0" smtClean="0">
+              <a:rPr lang="en-US" altLang="zh-CN" sz="1600" dirty="0" smtClean="0">
                 <a:solidFill>
                   <a:schemeClr val="tx1"/>
                 </a:solidFill>
               </a:rPr>
               <a:t> Li</a:t>
             </a:r>
-            <a:endParaRPr lang="zh-CN" sz="1400" dirty="0" smtClean="0">
+            <a:endParaRPr lang="zh-CN" sz="1600" dirty="0" smtClean="0">
               <a:solidFill>
                 <a:schemeClr val="tx1"/>
               </a:solidFill>
@@ -6119,15 +6119,23 @@
             </a:r>
             <a:r>
               <a:rPr lang="en-US" altLang="zh-CN" sz="1600" dirty="0" smtClean="0"/>
-              <a:t> task to find out how many spots, how large the trash can is needed, and how often trash needs to be collected, to keep a clean environment in a cost effective way. Our </a:t>
-            </a:r>
-            <a:r>
-              <a:rPr lang="en-US" altLang="zh-CN" sz="1600" dirty="0" err="1" smtClean="0"/>
-              <a:t>Iot</a:t>
+              <a:t> task to find out </a:t>
             </a:r>
             <a:r>
               <a:rPr lang="en-US" altLang="zh-CN" sz="1600" dirty="0" smtClean="0"/>
-              <a:t> project is</a:t>
+              <a:t>what/how many </a:t>
+            </a:r>
+            <a:r>
+              <a:rPr lang="en-US" altLang="zh-CN" sz="1600" dirty="0" smtClean="0"/>
+              <a:t>spots, how large the trash can is needed, and how often trash needs to be collected, to keep a clean environment in a cost effective way. Our </a:t>
+            </a:r>
+            <a:r>
+              <a:rPr lang="en-US" altLang="zh-CN" sz="1600" dirty="0" smtClean="0"/>
+              <a:t>IoT </a:t>
+            </a:r>
+            <a:r>
+              <a:rPr lang="en-US" altLang="zh-CN" sz="1600" dirty="0" smtClean="0"/>
+              <a:t>project is</a:t>
             </a:r>
             <a:r>
               <a:rPr lang="zh-CN" sz="1600" dirty="0" smtClean="0"/>
@@ -6139,11 +6147,7 @@
             </a:r>
             <a:r>
               <a:rPr lang="en-US" altLang="zh-CN" sz="1600" dirty="0" smtClean="0"/>
-              <a:t>monitoring, analysis </a:t>
-            </a:r>
-            <a:r>
-              <a:rPr lang="en-US" altLang="zh-CN" sz="1600" dirty="0" smtClean="0"/>
-              <a:t>and notification system for a environment like campus</a:t>
+              <a:t>monitoring, analysis and notification system for a environment like campus</a:t>
             </a:r>
             <a:r>
               <a:rPr lang="zh-CN" sz="1600" dirty="0" smtClean="0"/>
@@ -6863,8 +6867,12 @@
               <a:t>Init</a:t>
             </a:r>
             <a:r>
-              <a:rPr lang="en-US" altLang="zh-CN" sz="1200" dirty="0" smtClean="0"/>
-              <a:t> device</a:t>
+              <a:rPr lang="en-US" altLang="zh-CN" sz="1200" dirty="0" err="1"/>
+              <a:t>_</a:t>
+            </a:r>
+            <a:r>
+              <a:rPr lang="en-US" altLang="zh-CN" sz="1200" dirty="0" err="1" smtClean="0"/>
+              <a:t>device</a:t>
             </a:r>
             <a:endParaRPr lang="en-US" altLang="zh-CN" sz="1200" dirty="0"/>
           </a:p>
@@ -6905,7 +6913,7 @@
         <p:spPr>
           <a:xfrm>
             <a:off x="5652490" y="2327846"/>
-            <a:ext cx="1467068" cy="461665"/>
+            <a:ext cx="1508746" cy="461665"/>
           </a:xfrm>
           <a:prstGeom prst="rect">
             <a:avLst/>
@@ -6925,12 +6933,8 @@
               <a:t> </a:t>
             </a:r>
             <a:r>
-              <a:rPr lang="en-US" altLang="zh-CN" sz="1200" dirty="0" smtClean="0"/>
-              <a:t>Assign </a:t>
-            </a:r>
-            <a:r>
-              <a:rPr lang="en-US" altLang="zh-CN" sz="1200" dirty="0" smtClean="0"/>
-              <a:t>Device ID</a:t>
+              <a:rPr lang="en-US" altLang="zh-CN" sz="1200" dirty="0" err="1" smtClean="0"/>
+              <a:t>Assign_DeviceID</a:t>
             </a:r>
             <a:endParaRPr lang="en-US" altLang="zh-CN" sz="1200" dirty="0"/>
           </a:p>
@@ -6943,11 +6947,7 @@
             </a:r>
             <a:r>
               <a:rPr lang="en-US" altLang="zh-CN" sz="1200" dirty="0" err="1" smtClean="0"/>
-              <a:t>R</a:t>
-            </a:r>
-            <a:r>
-              <a:rPr lang="en-US" altLang="zh-CN" sz="1200" dirty="0" err="1" smtClean="0"/>
-              <a:t>equest_data</a:t>
+              <a:t>Request_data</a:t>
             </a:r>
             <a:endParaRPr lang="zh-CN" altLang="en-US" sz="1200" dirty="0"/>
           </a:p>
@@ -6989,11 +6989,7 @@
             </a:r>
             <a:r>
               <a:rPr lang="en-US" altLang="zh-CN" sz="1200" dirty="0" err="1" smtClean="0"/>
-              <a:t>report</a:t>
-            </a:r>
-            <a:r>
-              <a:rPr lang="en-US" altLang="zh-CN" sz="1200" dirty="0" err="1" smtClean="0"/>
-              <a:t>_data</a:t>
+              <a:t>report_data</a:t>
             </a:r>
             <a:endParaRPr lang="en-US" altLang="zh-CN" sz="1200" dirty="0" smtClean="0"/>
           </a:p>
@@ -7006,11 +7002,7 @@
             </a:r>
             <a:r>
               <a:rPr lang="en-US" altLang="zh-CN" sz="1200" dirty="0" err="1" smtClean="0"/>
-              <a:t>Recieve</a:t>
-            </a:r>
-            <a:r>
-              <a:rPr lang="en-US" altLang="zh-CN" sz="1200" dirty="0" err="1" smtClean="0"/>
-              <a:t>_query_result</a:t>
+              <a:t>Recieve_query_result</a:t>
             </a:r>
             <a:endParaRPr lang="en-US" altLang="zh-CN" sz="1200" dirty="0"/>
           </a:p>
@@ -7048,7 +7040,6 @@
               <a:rPr lang="en-US" altLang="zh-CN" sz="1200" dirty="0" smtClean="0"/>
               <a:t>Register Viewer</a:t>
             </a:r>
-            <a:endParaRPr lang="en-US" altLang="zh-CN" sz="1200" dirty="0" smtClean="0"/>
           </a:p>
           <a:p>
             <a:r>
@@ -7059,11 +7050,7 @@
             </a:r>
             <a:r>
               <a:rPr lang="en-US" altLang="zh-CN" sz="1200" dirty="0" err="1" smtClean="0"/>
-              <a:t>Request</a:t>
-            </a:r>
-            <a:r>
-              <a:rPr lang="en-US" altLang="zh-CN" sz="1200" dirty="0" err="1" smtClean="0"/>
-              <a:t>_data</a:t>
+              <a:t>Request_data</a:t>
             </a:r>
             <a:endParaRPr lang="en-US" altLang="zh-CN" sz="1200" dirty="0" smtClean="0"/>
           </a:p>
@@ -7431,11 +7418,7 @@
             </a:br>
             <a:r>
               <a:rPr lang="en-US" sz="1300" dirty="0" smtClean="0"/>
-              <a:t>(</a:t>
-            </a:r>
-            <a:r>
-              <a:rPr lang="en-US" sz="1300" dirty="0" smtClean="0"/>
-              <a:t>My</a:t>
+              <a:t>(My</a:t>
             </a:r>
             <a:r>
               <a:rPr lang="en-US" altLang="zh-CN" sz="1300" dirty="0" smtClean="0"/>

</xml_diff>